<commit_message>
Begin work on enemy spawning
</commit_message>
<xml_diff>
--- a/Class Assignments/Space Runner.pptx
+++ b/Class Assignments/Space Runner.pptx
@@ -112,6 +112,11 @@
       </a:defRPr>
     </a:lvl9pPr>
   </p:defaultTextStyle>
+  <p:extLst>
+    <p:ext uri="{EFAFB233-063F-42B5-8137-9DF3F51BA10A}">
+      <p15:sldGuideLst xmlns:p15="http://schemas.microsoft.com/office/powerpoint/2012/main"/>
+    </p:ext>
+  </p:extLst>
 </p:presentation>
 </file>
 
@@ -306,7 +311,7 @@
           <a:p>
             <a:fld id="{FCA9419F-856A-4BAD-BC13-3F355A87C73B}" type="datetimeFigureOut">
               <a:rPr lang="en-US" smtClean="0"/>
-              <a:t>4/23/2017</a:t>
+              <a:t>4/24/2017</a:t>
             </a:fld>
             <a:endParaRPr lang="en-US"/>
           </a:p>
@@ -742,7 +747,7 @@
           <a:p>
             <a:fld id="{FCA9419F-856A-4BAD-BC13-3F355A87C73B}" type="datetimeFigureOut">
               <a:rPr lang="en-US" smtClean="0"/>
-              <a:t>4/23/2017</a:t>
+              <a:t>4/24/2017</a:t>
             </a:fld>
             <a:endParaRPr lang="en-US"/>
           </a:p>
@@ -992,7 +997,7 @@
           <a:p>
             <a:fld id="{FCA9419F-856A-4BAD-BC13-3F355A87C73B}" type="datetimeFigureOut">
               <a:rPr lang="en-US" smtClean="0"/>
-              <a:t>4/23/2017</a:t>
+              <a:t>4/24/2017</a:t>
             </a:fld>
             <a:endParaRPr lang="en-US"/>
           </a:p>
@@ -1300,7 +1305,7 @@
           <a:p>
             <a:fld id="{FCA9419F-856A-4BAD-BC13-3F355A87C73B}" type="datetimeFigureOut">
               <a:rPr lang="en-US" smtClean="0"/>
-              <a:t>4/23/2017</a:t>
+              <a:t>4/24/2017</a:t>
             </a:fld>
             <a:endParaRPr lang="en-US"/>
           </a:p>
@@ -1618,7 +1623,7 @@
           <a:p>
             <a:fld id="{FCA9419F-856A-4BAD-BC13-3F355A87C73B}" type="datetimeFigureOut">
               <a:rPr lang="en-US" smtClean="0"/>
-              <a:t>4/23/2017</a:t>
+              <a:t>4/24/2017</a:t>
             </a:fld>
             <a:endParaRPr lang="en-US"/>
           </a:p>
@@ -1920,7 +1925,7 @@
           <a:p>
             <a:fld id="{FCA9419F-856A-4BAD-BC13-3F355A87C73B}" type="datetimeFigureOut">
               <a:rPr lang="en-US" smtClean="0"/>
-              <a:t>4/23/2017</a:t>
+              <a:t>4/24/2017</a:t>
             </a:fld>
             <a:endParaRPr lang="en-US"/>
           </a:p>
@@ -2287,7 +2292,7 @@
           <a:p>
             <a:fld id="{FCA9419F-856A-4BAD-BC13-3F355A87C73B}" type="datetimeFigureOut">
               <a:rPr lang="en-US" smtClean="0"/>
-              <a:t>4/23/2017</a:t>
+              <a:t>4/24/2017</a:t>
             </a:fld>
             <a:endParaRPr lang="en-US"/>
           </a:p>
@@ -2461,7 +2466,7 @@
           <a:p>
             <a:fld id="{FCA9419F-856A-4BAD-BC13-3F355A87C73B}" type="datetimeFigureOut">
               <a:rPr lang="en-US" smtClean="0"/>
-              <a:t>4/23/2017</a:t>
+              <a:t>4/24/2017</a:t>
             </a:fld>
             <a:endParaRPr lang="en-US"/>
           </a:p>
@@ -2641,7 +2646,7 @@
           <a:p>
             <a:fld id="{FCA9419F-856A-4BAD-BC13-3F355A87C73B}" type="datetimeFigureOut">
               <a:rPr lang="en-US" smtClean="0"/>
-              <a:t>4/23/2017</a:t>
+              <a:t>4/24/2017</a:t>
             </a:fld>
             <a:endParaRPr lang="en-US"/>
           </a:p>
@@ -2811,7 +2816,7 @@
           <a:p>
             <a:fld id="{FCA9419F-856A-4BAD-BC13-3F355A87C73B}" type="datetimeFigureOut">
               <a:rPr lang="en-US" smtClean="0"/>
-              <a:t>4/23/2017</a:t>
+              <a:t>4/24/2017</a:t>
             </a:fld>
             <a:endParaRPr lang="en-US"/>
           </a:p>
@@ -3061,7 +3066,7 @@
           <a:p>
             <a:fld id="{FCA9419F-856A-4BAD-BC13-3F355A87C73B}" type="datetimeFigureOut">
               <a:rPr lang="en-US" smtClean="0"/>
-              <a:t>4/23/2017</a:t>
+              <a:t>4/24/2017</a:t>
             </a:fld>
             <a:endParaRPr lang="en-US"/>
           </a:p>
@@ -3297,7 +3302,7 @@
           <a:p>
             <a:fld id="{FCA9419F-856A-4BAD-BC13-3F355A87C73B}" type="datetimeFigureOut">
               <a:rPr lang="en-US" smtClean="0"/>
-              <a:t>4/23/2017</a:t>
+              <a:t>4/24/2017</a:t>
             </a:fld>
             <a:endParaRPr lang="en-US"/>
           </a:p>
@@ -3679,7 +3684,7 @@
           <a:p>
             <a:fld id="{FCA9419F-856A-4BAD-BC13-3F355A87C73B}" type="datetimeFigureOut">
               <a:rPr lang="en-US" smtClean="0"/>
-              <a:t>4/23/2017</a:t>
+              <a:t>4/24/2017</a:t>
             </a:fld>
             <a:endParaRPr lang="en-US"/>
           </a:p>
@@ -3797,7 +3802,7 @@
           <a:p>
             <a:fld id="{FCA9419F-856A-4BAD-BC13-3F355A87C73B}" type="datetimeFigureOut">
               <a:rPr lang="en-US" smtClean="0"/>
-              <a:t>4/23/2017</a:t>
+              <a:t>4/24/2017</a:t>
             </a:fld>
             <a:endParaRPr lang="en-US"/>
           </a:p>
@@ -3892,7 +3897,7 @@
           <a:p>
             <a:fld id="{FCA9419F-856A-4BAD-BC13-3F355A87C73B}" type="datetimeFigureOut">
               <a:rPr lang="en-US" smtClean="0"/>
-              <a:t>4/23/2017</a:t>
+              <a:t>4/24/2017</a:t>
             </a:fld>
             <a:endParaRPr lang="en-US"/>
           </a:p>
@@ -4147,7 +4152,7 @@
           <a:p>
             <a:fld id="{FCA9419F-856A-4BAD-BC13-3F355A87C73B}" type="datetimeFigureOut">
               <a:rPr lang="en-US" smtClean="0"/>
-              <a:t>4/23/2017</a:t>
+              <a:t>4/24/2017</a:t>
             </a:fld>
             <a:endParaRPr lang="en-US"/>
           </a:p>
@@ -4430,7 +4435,7 @@
           <a:p>
             <a:fld id="{FCA9419F-856A-4BAD-BC13-3F355A87C73B}" type="datetimeFigureOut">
               <a:rPr lang="en-US" smtClean="0"/>
-              <a:t>4/23/2017</a:t>
+              <a:t>4/24/2017</a:t>
             </a:fld>
             <a:endParaRPr lang="en-US"/>
           </a:p>
@@ -4836,7 +4841,7 @@
           <a:p>
             <a:fld id="{FCA9419F-856A-4BAD-BC13-3F355A87C73B}" type="datetimeFigureOut">
               <a:rPr lang="en-US" smtClean="0"/>
-              <a:t>4/23/2017</a:t>
+              <a:t>4/24/2017</a:t>
             </a:fld>
             <a:endParaRPr lang="en-US"/>
           </a:p>
@@ -5770,9 +5775,37 @@
           <a:chExt cx="0" cy="0"/>
         </a:xfrm>
       </p:grpSpPr>
+      <p:sp>
+        <p:nvSpPr>
+          <p:cNvPr id="6" name="Title 1"/>
+          <p:cNvSpPr>
+            <a:spLocks noGrp="1"/>
+          </p:cNvSpPr>
+          <p:nvPr>
+            <p:ph type="title"/>
+          </p:nvPr>
+        </p:nvSpPr>
+        <p:spPr>
+          <a:xfrm>
+            <a:off x="684212" y="418672"/>
+            <a:ext cx="8534400" cy="1507067"/>
+          </a:xfrm>
+        </p:spPr>
+        <p:txBody>
+          <a:bodyPr/>
+          <a:lstStyle/>
+          <a:p>
+            <a:r>
+              <a:rPr lang="en-US" sz="4000" dirty="0"/>
+              <a:t>Interface</a:t>
+            </a:r>
+            <a:endParaRPr lang="en-US" dirty="0"/>
+          </a:p>
+        </p:txBody>
+      </p:sp>
       <p:pic>
         <p:nvPicPr>
-          <p:cNvPr id="5" name="Picture 4"/>
+          <p:cNvPr id="3" name="Picture 2"/>
           <p:cNvPicPr>
             <a:picLocks noChangeAspect="1"/>
           </p:cNvPicPr>
@@ -5792,42 +5825,14 @@
         </p:blipFill>
         <p:spPr>
           <a:xfrm>
-            <a:off x="0" y="1887522"/>
-            <a:ext cx="12191999" cy="4970477"/>
+            <a:off x="0" y="2146852"/>
+            <a:ext cx="12192000" cy="4711148"/>
           </a:xfrm>
           <a:prstGeom prst="rect">
             <a:avLst/>
           </a:prstGeom>
         </p:spPr>
       </p:pic>
-      <p:sp>
-        <p:nvSpPr>
-          <p:cNvPr id="6" name="Title 1"/>
-          <p:cNvSpPr>
-            <a:spLocks noGrp="1"/>
-          </p:cNvSpPr>
-          <p:nvPr>
-            <p:ph type="title"/>
-          </p:nvPr>
-        </p:nvSpPr>
-        <p:spPr>
-          <a:xfrm>
-            <a:off x="684212" y="418672"/>
-            <a:ext cx="8534400" cy="1507067"/>
-          </a:xfrm>
-        </p:spPr>
-        <p:txBody>
-          <a:bodyPr/>
-          <a:lstStyle/>
-          <a:p>
-            <a:r>
-              <a:rPr lang="en-US" sz="4000" dirty="0"/>
-              <a:t>Interface</a:t>
-            </a:r>
-            <a:endParaRPr lang="en-US" dirty="0"/>
-          </a:p>
-        </p:txBody>
-      </p:sp>
     </p:spTree>
     <p:extLst>
       <p:ext uri="{BB962C8B-B14F-4D97-AF65-F5344CB8AC3E}">

</xml_diff>